<commit_message>
[All Hosts] (overview) Reorienting overview for the M365 ecosystem
</commit_message>
<xml_diff>
--- a/docs/images/office-programmability-diagram.pptx
+++ b/docs/images/office-programmability-diagram.pptx
@@ -259,7 +259,7 @@
           <a:p>
             <a:fld id="{A5DE1490-FFED-4A1E-BD52-B117EB41F939}" type="datetimeFigureOut">
               <a:rPr lang="en-US" smtClean="0"/>
-              <a:t>3/10/2023</a:t>
+              <a:t>12/8/2025</a:t>
             </a:fld>
             <a:endParaRPr lang="en-US"/>
           </a:p>
@@ -457,7 +457,7 @@
           <a:p>
             <a:fld id="{A5DE1490-FFED-4A1E-BD52-B117EB41F939}" type="datetimeFigureOut">
               <a:rPr lang="en-US" smtClean="0"/>
-              <a:t>3/10/2023</a:t>
+              <a:t>12/8/2025</a:t>
             </a:fld>
             <a:endParaRPr lang="en-US"/>
           </a:p>
@@ -665,7 +665,7 @@
           <a:p>
             <a:fld id="{A5DE1490-FFED-4A1E-BD52-B117EB41F939}" type="datetimeFigureOut">
               <a:rPr lang="en-US" smtClean="0"/>
-              <a:t>3/10/2023</a:t>
+              <a:t>12/8/2025</a:t>
             </a:fld>
             <a:endParaRPr lang="en-US"/>
           </a:p>
@@ -863,7 +863,7 @@
           <a:p>
             <a:fld id="{A5DE1490-FFED-4A1E-BD52-B117EB41F939}" type="datetimeFigureOut">
               <a:rPr lang="en-US" smtClean="0"/>
-              <a:t>3/10/2023</a:t>
+              <a:t>12/8/2025</a:t>
             </a:fld>
             <a:endParaRPr lang="en-US"/>
           </a:p>
@@ -1138,7 +1138,7 @@
           <a:p>
             <a:fld id="{A5DE1490-FFED-4A1E-BD52-B117EB41F939}" type="datetimeFigureOut">
               <a:rPr lang="en-US" smtClean="0"/>
-              <a:t>3/10/2023</a:t>
+              <a:t>12/8/2025</a:t>
             </a:fld>
             <a:endParaRPr lang="en-US"/>
           </a:p>
@@ -1403,7 +1403,7 @@
           <a:p>
             <a:fld id="{A5DE1490-FFED-4A1E-BD52-B117EB41F939}" type="datetimeFigureOut">
               <a:rPr lang="en-US" smtClean="0"/>
-              <a:t>3/10/2023</a:t>
+              <a:t>12/8/2025</a:t>
             </a:fld>
             <a:endParaRPr lang="en-US"/>
           </a:p>
@@ -1815,7 +1815,7 @@
           <a:p>
             <a:fld id="{A5DE1490-FFED-4A1E-BD52-B117EB41F939}" type="datetimeFigureOut">
               <a:rPr lang="en-US" smtClean="0"/>
-              <a:t>3/10/2023</a:t>
+              <a:t>12/8/2025</a:t>
             </a:fld>
             <a:endParaRPr lang="en-US"/>
           </a:p>
@@ -1956,7 +1956,7 @@
           <a:p>
             <a:fld id="{A5DE1490-FFED-4A1E-BD52-B117EB41F939}" type="datetimeFigureOut">
               <a:rPr lang="en-US" smtClean="0"/>
-              <a:t>3/10/2023</a:t>
+              <a:t>12/8/2025</a:t>
             </a:fld>
             <a:endParaRPr lang="en-US"/>
           </a:p>
@@ -2069,7 +2069,7 @@
           <a:p>
             <a:fld id="{A5DE1490-FFED-4A1E-BD52-B117EB41F939}" type="datetimeFigureOut">
               <a:rPr lang="en-US" smtClean="0"/>
-              <a:t>3/10/2023</a:t>
+              <a:t>12/8/2025</a:t>
             </a:fld>
             <a:endParaRPr lang="en-US"/>
           </a:p>
@@ -2380,7 +2380,7 @@
           <a:p>
             <a:fld id="{A5DE1490-FFED-4A1E-BD52-B117EB41F939}" type="datetimeFigureOut">
               <a:rPr lang="en-US" smtClean="0"/>
-              <a:t>3/10/2023</a:t>
+              <a:t>12/8/2025</a:t>
             </a:fld>
             <a:endParaRPr lang="en-US"/>
           </a:p>
@@ -2668,7 +2668,7 @@
           <a:p>
             <a:fld id="{A5DE1490-FFED-4A1E-BD52-B117EB41F939}" type="datetimeFigureOut">
               <a:rPr lang="en-US" smtClean="0"/>
-              <a:t>3/10/2023</a:t>
+              <a:t>12/8/2025</a:t>
             </a:fld>
             <a:endParaRPr lang="en-US"/>
           </a:p>
@@ -2909,7 +2909,7 @@
           <a:p>
             <a:fld id="{A5DE1490-FFED-4A1E-BD52-B117EB41F939}" type="datetimeFigureOut">
               <a:rPr lang="en-US" smtClean="0"/>
-              <a:t>3/10/2023</a:t>
+              <a:t>12/8/2025</a:t>
             </a:fld>
             <a:endParaRPr lang="en-US"/>
           </a:p>
@@ -3675,8 +3675,8 @@
         </p:nvSpPr>
         <p:spPr>
           <a:xfrm>
-            <a:off x="5321672" y="6147836"/>
-            <a:ext cx="1688283" cy="215444"/>
+            <a:off x="5647242" y="6147836"/>
+            <a:ext cx="1037143" cy="215444"/>
           </a:xfrm>
           <a:prstGeom prst="rect">
             <a:avLst/>
@@ -3717,7 +3717,7 @@
                 <a:ea typeface="+mn-ea"/>
                 <a:cs typeface="+mn-cs"/>
               </a:rPr>
-              <a:t>End-user approachable</a:t>
+              <a:t>End-user skills</a:t>
             </a:r>
           </a:p>
         </p:txBody>
@@ -3874,7 +3874,7 @@
                 <a:ea typeface="+mn-ea"/>
                 <a:cs typeface="+mn-cs"/>
               </a:rPr>
-              <a:t>Desktop and individual</a:t>
+              <a:t>Windows only</a:t>
             </a:r>
           </a:p>
         </p:txBody>
@@ -3926,19 +3926,7 @@
             </a:pPr>
             <a:r>
               <a:rPr lang="en-US" sz="1400" dirty="0"/>
-              <a:t>Cross-platform </a:t>
-            </a:r>
-            <a:r>
-              <a:rPr lang="en-US" sz="1400"/>
-              <a:t>and </a:t>
-            </a:r>
-            <a:r>
-              <a:rPr lang="en-US" sz="1400" dirty="0"/>
-              <a:t>c</a:t>
-            </a:r>
-            <a:r>
-              <a:rPr lang="en-US" sz="1400"/>
-              <a:t>ollaboration</a:t>
+              <a:t>Cross-platform</a:t>
             </a:r>
             <a:endParaRPr kumimoji="0" lang="en-US" sz="1400" b="0" i="0" u="none" strike="noStrike" kern="1200" cap="none" normalizeH="0" baseline="0" noProof="0" dirty="0">
               <a:ln>
@@ -3967,8 +3955,8 @@
         </p:nvSpPr>
         <p:spPr>
           <a:xfrm>
-            <a:off x="5416120" y="1305094"/>
-            <a:ext cx="1499385" cy="215444"/>
+            <a:off x="5595657" y="1305094"/>
+            <a:ext cx="1140313" cy="215444"/>
           </a:xfrm>
           <a:prstGeom prst="rect">
             <a:avLst/>
@@ -4009,7 +3997,7 @@
                 <a:ea typeface="+mn-ea"/>
                 <a:cs typeface="+mn-cs"/>
               </a:rPr>
-              <a:t>Developer audience </a:t>
+              <a:t>Developer skills</a:t>
             </a:r>
           </a:p>
         </p:txBody>

</xml_diff>